<commit_message>
fix namespace case: only compare non-functions
</commit_message>
<xml_diff>
--- a/doc/Final Presentation/Incremental_Unit_Testing-20160725-v2.pptx
+++ b/doc/Final Presentation/Incremental_Unit_Testing-20160725-v2.pptx
@@ -1339,6 +1339,13 @@
         </dgm:presLayoutVars>
       </dgm:prSet>
       <dgm:spPr/>
+      <dgm:t>
+        <a:bodyPr/>
+        <a:lstStyle/>
+        <a:p>
+          <a:endParaRPr lang="zh-CN" altLang="en-US"/>
+        </a:p>
+      </dgm:t>
     </dgm:pt>
     <dgm:pt modelId="{07EF0A50-B111-A14F-8082-BFFCB6445398}" type="pres">
       <dgm:prSet presAssocID="{5588F76F-2B07-5643-AA45-92A5905A5DFA}" presName="root1" presStyleCnt="0"/>
@@ -1351,6 +1358,13 @@
         </dgm:presLayoutVars>
       </dgm:prSet>
       <dgm:spPr/>
+      <dgm:t>
+        <a:bodyPr/>
+        <a:lstStyle/>
+        <a:p>
+          <a:endParaRPr lang="zh-CN" altLang="en-US"/>
+        </a:p>
+      </dgm:t>
     </dgm:pt>
     <dgm:pt modelId="{D311CBDD-C193-114B-8F77-C72D9DE2269D}" type="pres">
       <dgm:prSet presAssocID="{5588F76F-2B07-5643-AA45-92A5905A5DFA}" presName="level2hierChild" presStyleCnt="0"/>
@@ -1359,10 +1373,24 @@
     <dgm:pt modelId="{5B3639FC-14DC-554C-9F67-001CA1AF5A73}" type="pres">
       <dgm:prSet presAssocID="{68AC52BB-09C8-AA41-9082-8E4C7C261564}" presName="conn2-1" presStyleLbl="parChTrans1D2" presStyleIdx="0" presStyleCnt="3"/>
       <dgm:spPr/>
+      <dgm:t>
+        <a:bodyPr/>
+        <a:lstStyle/>
+        <a:p>
+          <a:endParaRPr lang="zh-CN" altLang="en-US"/>
+        </a:p>
+      </dgm:t>
     </dgm:pt>
     <dgm:pt modelId="{1873B89D-00BB-5E41-A2EF-7F1EBE5D1138}" type="pres">
       <dgm:prSet presAssocID="{68AC52BB-09C8-AA41-9082-8E4C7C261564}" presName="connTx" presStyleLbl="parChTrans1D2" presStyleIdx="0" presStyleCnt="3"/>
       <dgm:spPr/>
+      <dgm:t>
+        <a:bodyPr/>
+        <a:lstStyle/>
+        <a:p>
+          <a:endParaRPr lang="zh-CN" altLang="en-US"/>
+        </a:p>
+      </dgm:t>
     </dgm:pt>
     <dgm:pt modelId="{62B4609A-0F72-8B45-9CB6-235D44C7770A}" type="pres">
       <dgm:prSet presAssocID="{EC5D70B2-FD0D-D745-8F93-5839A0E548B8}" presName="root2" presStyleCnt="0"/>
@@ -1375,6 +1403,13 @@
         </dgm:presLayoutVars>
       </dgm:prSet>
       <dgm:spPr/>
+      <dgm:t>
+        <a:bodyPr/>
+        <a:lstStyle/>
+        <a:p>
+          <a:endParaRPr lang="zh-CN" altLang="en-US"/>
+        </a:p>
+      </dgm:t>
     </dgm:pt>
     <dgm:pt modelId="{C0C27C02-FDD8-5242-9BE4-5677ECCCD946}" type="pres">
       <dgm:prSet presAssocID="{EC5D70B2-FD0D-D745-8F93-5839A0E548B8}" presName="level3hierChild" presStyleCnt="0"/>
@@ -1383,10 +1418,24 @@
     <dgm:pt modelId="{E71B31F9-EA28-4C46-BCA2-AF34E9C4D51C}" type="pres">
       <dgm:prSet presAssocID="{41F14603-4472-C148-A446-DDA7BF79C6C8}" presName="conn2-1" presStyleLbl="parChTrans1D2" presStyleIdx="1" presStyleCnt="3"/>
       <dgm:spPr/>
+      <dgm:t>
+        <a:bodyPr/>
+        <a:lstStyle/>
+        <a:p>
+          <a:endParaRPr lang="zh-CN" altLang="en-US"/>
+        </a:p>
+      </dgm:t>
     </dgm:pt>
     <dgm:pt modelId="{53E1A24E-9C60-974D-B71E-99DDA4B9E5F5}" type="pres">
       <dgm:prSet presAssocID="{41F14603-4472-C148-A446-DDA7BF79C6C8}" presName="connTx" presStyleLbl="parChTrans1D2" presStyleIdx="1" presStyleCnt="3"/>
       <dgm:spPr/>
+      <dgm:t>
+        <a:bodyPr/>
+        <a:lstStyle/>
+        <a:p>
+          <a:endParaRPr lang="zh-CN" altLang="en-US"/>
+        </a:p>
+      </dgm:t>
     </dgm:pt>
     <dgm:pt modelId="{EAA0AB88-B450-5E42-9399-05B1C8A007D4}" type="pres">
       <dgm:prSet presAssocID="{87146BDA-3451-394B-848B-FF2EB4508E43}" presName="root2" presStyleCnt="0"/>
@@ -1399,6 +1448,13 @@
         </dgm:presLayoutVars>
       </dgm:prSet>
       <dgm:spPr/>
+      <dgm:t>
+        <a:bodyPr/>
+        <a:lstStyle/>
+        <a:p>
+          <a:endParaRPr lang="zh-CN" altLang="en-US"/>
+        </a:p>
+      </dgm:t>
     </dgm:pt>
     <dgm:pt modelId="{B29B5E61-07E7-B846-A6EB-B78CE89F29E5}" type="pres">
       <dgm:prSet presAssocID="{87146BDA-3451-394B-848B-FF2EB4508E43}" presName="level3hierChild" presStyleCnt="0"/>
@@ -1407,10 +1463,24 @@
     <dgm:pt modelId="{F605640A-40C0-3043-A71A-DF374B429F1E}" type="pres">
       <dgm:prSet presAssocID="{F554AAE0-E306-1847-9B28-C7BB238C8B53}" presName="conn2-1" presStyleLbl="parChTrans1D2" presStyleIdx="2" presStyleCnt="3"/>
       <dgm:spPr/>
+      <dgm:t>
+        <a:bodyPr/>
+        <a:lstStyle/>
+        <a:p>
+          <a:endParaRPr lang="zh-CN" altLang="en-US"/>
+        </a:p>
+      </dgm:t>
     </dgm:pt>
     <dgm:pt modelId="{43A38733-0813-A54F-A459-A11C320FB82F}" type="pres">
       <dgm:prSet presAssocID="{F554AAE0-E306-1847-9B28-C7BB238C8B53}" presName="connTx" presStyleLbl="parChTrans1D2" presStyleIdx="2" presStyleCnt="3"/>
       <dgm:spPr/>
+      <dgm:t>
+        <a:bodyPr/>
+        <a:lstStyle/>
+        <a:p>
+          <a:endParaRPr lang="zh-CN" altLang="en-US"/>
+        </a:p>
+      </dgm:t>
     </dgm:pt>
     <dgm:pt modelId="{EA196109-77D1-A643-9816-C28A76EF9273}" type="pres">
       <dgm:prSet presAssocID="{2008C188-984C-EB42-9A99-54EF570EC778}" presName="root2" presStyleCnt="0"/>
@@ -1423,6 +1493,13 @@
         </dgm:presLayoutVars>
       </dgm:prSet>
       <dgm:spPr/>
+      <dgm:t>
+        <a:bodyPr/>
+        <a:lstStyle/>
+        <a:p>
+          <a:endParaRPr lang="zh-CN" altLang="en-US"/>
+        </a:p>
+      </dgm:t>
     </dgm:pt>
     <dgm:pt modelId="{D92D2897-F6E1-C843-8877-58D1772335AC}" type="pres">
       <dgm:prSet presAssocID="{2008C188-984C-EB42-9A99-54EF570EC778}" presName="level3hierChild" presStyleCnt="0"/>
@@ -1431,10 +1508,24 @@
     <dgm:pt modelId="{4DAD1A10-78DA-1541-A7E4-BCC057646F6D}" type="pres">
       <dgm:prSet presAssocID="{7A4A78B6-7650-744A-97AE-DD670622DDB6}" presName="conn2-1" presStyleLbl="parChTrans1D3" presStyleIdx="0" presStyleCnt="2"/>
       <dgm:spPr/>
+      <dgm:t>
+        <a:bodyPr/>
+        <a:lstStyle/>
+        <a:p>
+          <a:endParaRPr lang="zh-CN" altLang="en-US"/>
+        </a:p>
+      </dgm:t>
     </dgm:pt>
     <dgm:pt modelId="{A4A3AF2F-4ECF-FA4E-B44A-11FA306CDA3A}" type="pres">
       <dgm:prSet presAssocID="{7A4A78B6-7650-744A-97AE-DD670622DDB6}" presName="connTx" presStyleLbl="parChTrans1D3" presStyleIdx="0" presStyleCnt="2"/>
       <dgm:spPr/>
+      <dgm:t>
+        <a:bodyPr/>
+        <a:lstStyle/>
+        <a:p>
+          <a:endParaRPr lang="zh-CN" altLang="en-US"/>
+        </a:p>
+      </dgm:t>
     </dgm:pt>
     <dgm:pt modelId="{8127F7FC-E712-5147-81C2-EB5A1381B0F1}" type="pres">
       <dgm:prSet presAssocID="{2F655AA3-8B0C-EE43-9B86-2C41C5C657AE}" presName="root2" presStyleCnt="0"/>
@@ -1447,6 +1538,13 @@
         </dgm:presLayoutVars>
       </dgm:prSet>
       <dgm:spPr/>
+      <dgm:t>
+        <a:bodyPr/>
+        <a:lstStyle/>
+        <a:p>
+          <a:endParaRPr lang="zh-CN" altLang="en-US"/>
+        </a:p>
+      </dgm:t>
     </dgm:pt>
     <dgm:pt modelId="{FEE16F3F-465C-E344-BCC6-6E1FC471EF83}" type="pres">
       <dgm:prSet presAssocID="{2F655AA3-8B0C-EE43-9B86-2C41C5C657AE}" presName="level3hierChild" presStyleCnt="0"/>
@@ -1455,10 +1553,24 @@
     <dgm:pt modelId="{7E0A796B-B043-F64A-B253-684C1161428E}" type="pres">
       <dgm:prSet presAssocID="{BA7B217B-AA21-BF48-B8D6-D025C1BEE193}" presName="conn2-1" presStyleLbl="parChTrans1D4" presStyleIdx="0" presStyleCnt="4"/>
       <dgm:spPr/>
+      <dgm:t>
+        <a:bodyPr/>
+        <a:lstStyle/>
+        <a:p>
+          <a:endParaRPr lang="zh-CN" altLang="en-US"/>
+        </a:p>
+      </dgm:t>
     </dgm:pt>
     <dgm:pt modelId="{E4E87504-3A94-B447-B9E2-3B3F1FBB3D34}" type="pres">
       <dgm:prSet presAssocID="{BA7B217B-AA21-BF48-B8D6-D025C1BEE193}" presName="connTx" presStyleLbl="parChTrans1D4" presStyleIdx="0" presStyleCnt="4"/>
       <dgm:spPr/>
+      <dgm:t>
+        <a:bodyPr/>
+        <a:lstStyle/>
+        <a:p>
+          <a:endParaRPr lang="zh-CN" altLang="en-US"/>
+        </a:p>
+      </dgm:t>
     </dgm:pt>
     <dgm:pt modelId="{B59ED30C-062A-F543-A92A-15E3359143F8}" type="pres">
       <dgm:prSet presAssocID="{408D3B87-005C-4B4A-BEAA-0474F422174A}" presName="root2" presStyleCnt="0"/>
@@ -1471,6 +1583,13 @@
         </dgm:presLayoutVars>
       </dgm:prSet>
       <dgm:spPr/>
+      <dgm:t>
+        <a:bodyPr/>
+        <a:lstStyle/>
+        <a:p>
+          <a:endParaRPr lang="zh-CN" altLang="en-US"/>
+        </a:p>
+      </dgm:t>
     </dgm:pt>
     <dgm:pt modelId="{72B80C3C-73B5-5440-8A17-67040D592ADF}" type="pres">
       <dgm:prSet presAssocID="{408D3B87-005C-4B4A-BEAA-0474F422174A}" presName="level3hierChild" presStyleCnt="0"/>
@@ -1479,10 +1598,24 @@
     <dgm:pt modelId="{989AA386-4845-DA4D-ABC4-9CA92925452B}" type="pres">
       <dgm:prSet presAssocID="{4FA52D7E-30AD-FA46-86F1-453DFA0B9E7F}" presName="conn2-1" presStyleLbl="parChTrans1D4" presStyleIdx="1" presStyleCnt="4"/>
       <dgm:spPr/>
+      <dgm:t>
+        <a:bodyPr/>
+        <a:lstStyle/>
+        <a:p>
+          <a:endParaRPr lang="zh-CN" altLang="en-US"/>
+        </a:p>
+      </dgm:t>
     </dgm:pt>
     <dgm:pt modelId="{2AFB9593-7D43-534B-90BB-DE4BABDD0D98}" type="pres">
       <dgm:prSet presAssocID="{4FA52D7E-30AD-FA46-86F1-453DFA0B9E7F}" presName="connTx" presStyleLbl="parChTrans1D4" presStyleIdx="1" presStyleCnt="4"/>
       <dgm:spPr/>
+      <dgm:t>
+        <a:bodyPr/>
+        <a:lstStyle/>
+        <a:p>
+          <a:endParaRPr lang="zh-CN" altLang="en-US"/>
+        </a:p>
+      </dgm:t>
     </dgm:pt>
     <dgm:pt modelId="{6FC11114-1607-A745-B998-7E8F9D41D679}" type="pres">
       <dgm:prSet presAssocID="{6DC44A88-7C94-6A46-AF86-016A58885743}" presName="root2" presStyleCnt="0"/>
@@ -1495,6 +1628,13 @@
         </dgm:presLayoutVars>
       </dgm:prSet>
       <dgm:spPr/>
+      <dgm:t>
+        <a:bodyPr/>
+        <a:lstStyle/>
+        <a:p>
+          <a:endParaRPr lang="zh-CN" altLang="en-US"/>
+        </a:p>
+      </dgm:t>
     </dgm:pt>
     <dgm:pt modelId="{669EF50D-0D2B-E94E-A456-C754EB0E54A1}" type="pres">
       <dgm:prSet presAssocID="{6DC44A88-7C94-6A46-AF86-016A58885743}" presName="level3hierChild" presStyleCnt="0"/>
@@ -1503,10 +1643,24 @@
     <dgm:pt modelId="{BA2BE110-44CA-F943-93CE-D7022016A45D}" type="pres">
       <dgm:prSet presAssocID="{1D08D1D6-25C6-C945-A316-EBE9DA901DE0}" presName="conn2-1" presStyleLbl="parChTrans1D4" presStyleIdx="2" presStyleCnt="4"/>
       <dgm:spPr/>
+      <dgm:t>
+        <a:bodyPr/>
+        <a:lstStyle/>
+        <a:p>
+          <a:endParaRPr lang="zh-CN" altLang="en-US"/>
+        </a:p>
+      </dgm:t>
     </dgm:pt>
     <dgm:pt modelId="{849F62B3-2267-7142-86D6-6CCEEFD5AEE3}" type="pres">
       <dgm:prSet presAssocID="{1D08D1D6-25C6-C945-A316-EBE9DA901DE0}" presName="connTx" presStyleLbl="parChTrans1D4" presStyleIdx="2" presStyleCnt="4"/>
       <dgm:spPr/>
+      <dgm:t>
+        <a:bodyPr/>
+        <a:lstStyle/>
+        <a:p>
+          <a:endParaRPr lang="zh-CN" altLang="en-US"/>
+        </a:p>
+      </dgm:t>
     </dgm:pt>
     <dgm:pt modelId="{1F584A4D-BD4F-DD40-B905-8FA2E157A27B}" type="pres">
       <dgm:prSet presAssocID="{05D82705-A175-7A48-9194-3E22A0A3DA6B}" presName="root2" presStyleCnt="0"/>
@@ -1519,6 +1673,13 @@
         </dgm:presLayoutVars>
       </dgm:prSet>
       <dgm:spPr/>
+      <dgm:t>
+        <a:bodyPr/>
+        <a:lstStyle/>
+        <a:p>
+          <a:endParaRPr lang="zh-CN" altLang="en-US"/>
+        </a:p>
+      </dgm:t>
     </dgm:pt>
     <dgm:pt modelId="{ECAB3C36-B840-C341-BA6A-E9E42052B078}" type="pres">
       <dgm:prSet presAssocID="{05D82705-A175-7A48-9194-3E22A0A3DA6B}" presName="level3hierChild" presStyleCnt="0"/>
@@ -1527,10 +1688,24 @@
     <dgm:pt modelId="{96BB64EB-D4A5-9C45-9F44-FFDB16C37FFD}" type="pres">
       <dgm:prSet presAssocID="{1A3E4D12-98DB-5343-917C-FF22DC94A1D8}" presName="conn2-1" presStyleLbl="parChTrans1D3" presStyleIdx="1" presStyleCnt="2"/>
       <dgm:spPr/>
+      <dgm:t>
+        <a:bodyPr/>
+        <a:lstStyle/>
+        <a:p>
+          <a:endParaRPr lang="zh-CN" altLang="en-US"/>
+        </a:p>
+      </dgm:t>
     </dgm:pt>
     <dgm:pt modelId="{06035048-FB5E-5141-ADCB-FFA164539ECE}" type="pres">
       <dgm:prSet presAssocID="{1A3E4D12-98DB-5343-917C-FF22DC94A1D8}" presName="connTx" presStyleLbl="parChTrans1D3" presStyleIdx="1" presStyleCnt="2"/>
       <dgm:spPr/>
+      <dgm:t>
+        <a:bodyPr/>
+        <a:lstStyle/>
+        <a:p>
+          <a:endParaRPr lang="zh-CN" altLang="en-US"/>
+        </a:p>
+      </dgm:t>
     </dgm:pt>
     <dgm:pt modelId="{57F65F33-F613-9E4D-9757-69CD95320BD3}" type="pres">
       <dgm:prSet presAssocID="{66972AAD-CE25-3C4D-AA39-2921321A455C}" presName="root2" presStyleCnt="0"/>
@@ -1543,6 +1718,13 @@
         </dgm:presLayoutVars>
       </dgm:prSet>
       <dgm:spPr/>
+      <dgm:t>
+        <a:bodyPr/>
+        <a:lstStyle/>
+        <a:p>
+          <a:endParaRPr lang="zh-CN" altLang="en-US"/>
+        </a:p>
+      </dgm:t>
     </dgm:pt>
     <dgm:pt modelId="{2B10BE69-40F3-384E-BD5B-DA460DAE00F3}" type="pres">
       <dgm:prSet presAssocID="{66972AAD-CE25-3C4D-AA39-2921321A455C}" presName="level3hierChild" presStyleCnt="0"/>
@@ -1551,10 +1733,24 @@
     <dgm:pt modelId="{B559DE7E-F1E3-6549-B6B8-F70F768DA1B3}" type="pres">
       <dgm:prSet presAssocID="{37AD2590-FA2F-1B47-BE05-80979CDB28D0}" presName="conn2-1" presStyleLbl="parChTrans1D4" presStyleIdx="3" presStyleCnt="4"/>
       <dgm:spPr/>
+      <dgm:t>
+        <a:bodyPr/>
+        <a:lstStyle/>
+        <a:p>
+          <a:endParaRPr lang="zh-CN" altLang="en-US"/>
+        </a:p>
+      </dgm:t>
     </dgm:pt>
     <dgm:pt modelId="{939115CB-5073-2241-8E8C-CE6C877A329A}" type="pres">
       <dgm:prSet presAssocID="{37AD2590-FA2F-1B47-BE05-80979CDB28D0}" presName="connTx" presStyleLbl="parChTrans1D4" presStyleIdx="3" presStyleCnt="4"/>
       <dgm:spPr/>
+      <dgm:t>
+        <a:bodyPr/>
+        <a:lstStyle/>
+        <a:p>
+          <a:endParaRPr lang="zh-CN" altLang="en-US"/>
+        </a:p>
+      </dgm:t>
     </dgm:pt>
     <dgm:pt modelId="{EBB685CE-FC39-414D-9F74-EC53CA34198D}" type="pres">
       <dgm:prSet presAssocID="{3B4CD158-4482-3541-A5DB-9D53B889F77B}" presName="root2" presStyleCnt="0"/>
@@ -1567,6 +1763,13 @@
         </dgm:presLayoutVars>
       </dgm:prSet>
       <dgm:spPr/>
+      <dgm:t>
+        <a:bodyPr/>
+        <a:lstStyle/>
+        <a:p>
+          <a:endParaRPr lang="zh-CN" altLang="en-US"/>
+        </a:p>
+      </dgm:t>
     </dgm:pt>
     <dgm:pt modelId="{0AB1AC89-5941-BF45-8EDE-A45221544553}" type="pres">
       <dgm:prSet presAssocID="{3B4CD158-4482-3541-A5DB-9D53B889F77B}" presName="level3hierChild" presStyleCnt="0"/>
@@ -1768,7 +1971,7 @@
         </a:bodyPr>
         <a:lstStyle/>
         <a:p>
-          <a:pPr marL="0" lvl="0" indent="0" algn="ctr" defTabSz="755650" rtl="0">
+          <a:pPr lvl="0" algn="ctr" defTabSz="755650" rtl="0">
             <a:lnSpc>
               <a:spcPct val="90000"/>
             </a:lnSpc>
@@ -1778,7 +1981,6 @@
             <a:spcAft>
               <a:spcPct val="35000"/>
             </a:spcAft>
-            <a:buNone/>
           </a:pPr>
           <a:r>
             <a:rPr lang="en-US" sz="1700" kern="1200" dirty="0"/>
@@ -1851,7 +2053,7 @@
         </a:bodyPr>
         <a:lstStyle/>
         <a:p>
-          <a:pPr marL="0" lvl="0" indent="0" algn="ctr" defTabSz="222250">
+          <a:pPr lvl="0" algn="ctr" defTabSz="222250">
             <a:lnSpc>
               <a:spcPct val="90000"/>
             </a:lnSpc>
@@ -1861,7 +2063,6 @@
             <a:spcAft>
               <a:spcPct val="35000"/>
             </a:spcAft>
-            <a:buNone/>
           </a:pPr>
           <a:endParaRPr lang="zh-CN" altLang="en-US" sz="500" kern="1200"/>
         </a:p>
@@ -1959,7 +2160,7 @@
         </a:bodyPr>
         <a:lstStyle/>
         <a:p>
-          <a:pPr marL="0" lvl="0" indent="0" algn="ctr" defTabSz="755650" rtl="0">
+          <a:pPr lvl="0" algn="ctr" defTabSz="755650" rtl="0">
             <a:lnSpc>
               <a:spcPct val="90000"/>
             </a:lnSpc>
@@ -1969,7 +2170,6 @@
             <a:spcAft>
               <a:spcPct val="35000"/>
             </a:spcAft>
-            <a:buNone/>
           </a:pPr>
           <a:r>
             <a:rPr lang="en-US" sz="1700" kern="1200"/>
@@ -2042,7 +2242,7 @@
         </a:bodyPr>
         <a:lstStyle/>
         <a:p>
-          <a:pPr marL="0" lvl="0" indent="0" algn="ctr" defTabSz="222250">
+          <a:pPr lvl="0" algn="ctr" defTabSz="222250">
             <a:lnSpc>
               <a:spcPct val="90000"/>
             </a:lnSpc>
@@ -2052,7 +2252,6 @@
             <a:spcAft>
               <a:spcPct val="35000"/>
             </a:spcAft>
-            <a:buNone/>
           </a:pPr>
           <a:endParaRPr lang="zh-CN" altLang="en-US" sz="500" kern="1200"/>
         </a:p>
@@ -2150,7 +2349,7 @@
         </a:bodyPr>
         <a:lstStyle/>
         <a:p>
-          <a:pPr marL="0" lvl="0" indent="0" algn="ctr" defTabSz="755650" rtl="0">
+          <a:pPr lvl="0" algn="ctr" defTabSz="755650" rtl="0">
             <a:lnSpc>
               <a:spcPct val="90000"/>
             </a:lnSpc>
@@ -2160,7 +2359,6 @@
             <a:spcAft>
               <a:spcPct val="35000"/>
             </a:spcAft>
-            <a:buNone/>
           </a:pPr>
           <a:r>
             <a:rPr lang="en-US" sz="1700" kern="1200"/>
@@ -2241,7 +2439,7 @@
         </a:bodyPr>
         <a:lstStyle/>
         <a:p>
-          <a:pPr marL="0" lvl="0" indent="0" algn="ctr" defTabSz="222250">
+          <a:pPr lvl="0" algn="ctr" defTabSz="222250">
             <a:lnSpc>
               <a:spcPct val="90000"/>
             </a:lnSpc>
@@ -2251,7 +2449,6 @@
             <a:spcAft>
               <a:spcPct val="35000"/>
             </a:spcAft>
-            <a:buNone/>
           </a:pPr>
           <a:endParaRPr lang="zh-CN" altLang="en-US" sz="500" kern="1200"/>
         </a:p>
@@ -2349,7 +2546,7 @@
         </a:bodyPr>
         <a:lstStyle/>
         <a:p>
-          <a:pPr marL="0" lvl="0" indent="0" algn="ctr" defTabSz="755650" rtl="0">
+          <a:pPr lvl="0" algn="ctr" defTabSz="755650" rtl="0">
             <a:lnSpc>
               <a:spcPct val="90000"/>
             </a:lnSpc>
@@ -2359,7 +2556,6 @@
             <a:spcAft>
               <a:spcPct val="35000"/>
             </a:spcAft>
-            <a:buNone/>
           </a:pPr>
           <a:r>
             <a:rPr lang="en-US" sz="1700" kern="1200"/>
@@ -2432,7 +2628,7 @@
         </a:bodyPr>
         <a:lstStyle/>
         <a:p>
-          <a:pPr marL="0" lvl="0" indent="0" algn="ctr" defTabSz="222250">
+          <a:pPr lvl="0" algn="ctr" defTabSz="222250">
             <a:lnSpc>
               <a:spcPct val="90000"/>
             </a:lnSpc>
@@ -2442,7 +2638,6 @@
             <a:spcAft>
               <a:spcPct val="35000"/>
             </a:spcAft>
-            <a:buNone/>
           </a:pPr>
           <a:endParaRPr lang="zh-CN" altLang="en-US" sz="500" kern="1200"/>
         </a:p>
@@ -2540,7 +2735,7 @@
         </a:bodyPr>
         <a:lstStyle/>
         <a:p>
-          <a:pPr marL="0" lvl="0" indent="0" algn="ctr" defTabSz="755650" rtl="0">
+          <a:pPr lvl="0" algn="ctr" defTabSz="755650" rtl="0">
             <a:lnSpc>
               <a:spcPct val="90000"/>
             </a:lnSpc>
@@ -2550,7 +2745,6 @@
             <a:spcAft>
               <a:spcPct val="35000"/>
             </a:spcAft>
-            <a:buNone/>
           </a:pPr>
           <a:r>
             <a:rPr lang="en-US" sz="1700" kern="1200"/>
@@ -2623,7 +2817,7 @@
         </a:bodyPr>
         <a:lstStyle/>
         <a:p>
-          <a:pPr marL="0" lvl="0" indent="0" algn="ctr" defTabSz="222250">
+          <a:pPr lvl="0" algn="ctr" defTabSz="222250">
             <a:lnSpc>
               <a:spcPct val="90000"/>
             </a:lnSpc>
@@ -2633,7 +2827,6 @@
             <a:spcAft>
               <a:spcPct val="35000"/>
             </a:spcAft>
-            <a:buNone/>
           </a:pPr>
           <a:endParaRPr lang="zh-CN" altLang="en-US" sz="500" kern="1200"/>
         </a:p>
@@ -2731,7 +2924,7 @@
         </a:bodyPr>
         <a:lstStyle/>
         <a:p>
-          <a:pPr marL="0" lvl="0" indent="0" algn="ctr" defTabSz="755650" rtl="0">
+          <a:pPr lvl="0" algn="ctr" defTabSz="755650" rtl="0">
             <a:lnSpc>
               <a:spcPct val="90000"/>
             </a:lnSpc>
@@ -2741,7 +2934,6 @@
             <a:spcAft>
               <a:spcPct val="35000"/>
             </a:spcAft>
-            <a:buNone/>
           </a:pPr>
           <a:r>
             <a:rPr lang="en-US" sz="1700" kern="1200"/>
@@ -2814,7 +3006,7 @@
         </a:bodyPr>
         <a:lstStyle/>
         <a:p>
-          <a:pPr marL="0" lvl="0" indent="0" algn="ctr" defTabSz="222250">
+          <a:pPr lvl="0" algn="ctr" defTabSz="222250">
             <a:lnSpc>
               <a:spcPct val="90000"/>
             </a:lnSpc>
@@ -2824,7 +3016,6 @@
             <a:spcAft>
               <a:spcPct val="35000"/>
             </a:spcAft>
-            <a:buNone/>
           </a:pPr>
           <a:endParaRPr lang="zh-CN" altLang="en-US" sz="500" kern="1200"/>
         </a:p>
@@ -2922,7 +3113,7 @@
         </a:bodyPr>
         <a:lstStyle/>
         <a:p>
-          <a:pPr marL="0" lvl="0" indent="0" algn="ctr" defTabSz="755650" rtl="0">
+          <a:pPr lvl="0" algn="ctr" defTabSz="755650" rtl="0">
             <a:lnSpc>
               <a:spcPct val="90000"/>
             </a:lnSpc>
@@ -2932,7 +3123,6 @@
             <a:spcAft>
               <a:spcPct val="35000"/>
             </a:spcAft>
-            <a:buNone/>
           </a:pPr>
           <a:r>
             <a:rPr lang="en-US" sz="1700" kern="1200"/>
@@ -3005,7 +3195,7 @@
         </a:bodyPr>
         <a:lstStyle/>
         <a:p>
-          <a:pPr marL="0" lvl="0" indent="0" algn="ctr" defTabSz="222250">
+          <a:pPr lvl="0" algn="ctr" defTabSz="222250">
             <a:lnSpc>
               <a:spcPct val="90000"/>
             </a:lnSpc>
@@ -3015,7 +3205,6 @@
             <a:spcAft>
               <a:spcPct val="35000"/>
             </a:spcAft>
-            <a:buNone/>
           </a:pPr>
           <a:endParaRPr lang="zh-CN" altLang="en-US" sz="500" kern="1200"/>
         </a:p>
@@ -3113,7 +3302,7 @@
         </a:bodyPr>
         <a:lstStyle/>
         <a:p>
-          <a:pPr marL="0" lvl="0" indent="0" algn="ctr" defTabSz="755650" rtl="0">
+          <a:pPr lvl="0" algn="ctr" defTabSz="755650" rtl="0">
             <a:lnSpc>
               <a:spcPct val="90000"/>
             </a:lnSpc>
@@ -3123,7 +3312,6 @@
             <a:spcAft>
               <a:spcPct val="35000"/>
             </a:spcAft>
-            <a:buNone/>
           </a:pPr>
           <a:r>
             <a:rPr lang="en-US" sz="1700" kern="1200"/>
@@ -3204,7 +3392,7 @@
         </a:bodyPr>
         <a:lstStyle/>
         <a:p>
-          <a:pPr marL="0" lvl="0" indent="0" algn="ctr" defTabSz="222250">
+          <a:pPr lvl="0" algn="ctr" defTabSz="222250">
             <a:lnSpc>
               <a:spcPct val="90000"/>
             </a:lnSpc>
@@ -3214,7 +3402,6 @@
             <a:spcAft>
               <a:spcPct val="35000"/>
             </a:spcAft>
-            <a:buNone/>
           </a:pPr>
           <a:endParaRPr lang="zh-CN" altLang="en-US" sz="500" kern="1200"/>
         </a:p>
@@ -3312,7 +3499,7 @@
         </a:bodyPr>
         <a:lstStyle/>
         <a:p>
-          <a:pPr marL="0" lvl="0" indent="0" algn="ctr" defTabSz="755650" rtl="0">
+          <a:pPr lvl="0" algn="ctr" defTabSz="755650" rtl="0">
             <a:lnSpc>
               <a:spcPct val="90000"/>
             </a:lnSpc>
@@ -3322,7 +3509,6 @@
             <a:spcAft>
               <a:spcPct val="35000"/>
             </a:spcAft>
-            <a:buNone/>
           </a:pPr>
           <a:r>
             <a:rPr lang="en-US" sz="1700" kern="1200"/>
@@ -3403,7 +3589,7 @@
         </a:bodyPr>
         <a:lstStyle/>
         <a:p>
-          <a:pPr marL="0" lvl="0" indent="0" algn="ctr" defTabSz="222250">
+          <a:pPr lvl="0" algn="ctr" defTabSz="222250">
             <a:lnSpc>
               <a:spcPct val="90000"/>
             </a:lnSpc>
@@ -3413,7 +3599,6 @@
             <a:spcAft>
               <a:spcPct val="35000"/>
             </a:spcAft>
-            <a:buNone/>
           </a:pPr>
           <a:endParaRPr lang="zh-CN" altLang="en-US" sz="500" kern="1200"/>
         </a:p>
@@ -3511,7 +3696,7 @@
         </a:bodyPr>
         <a:lstStyle/>
         <a:p>
-          <a:pPr marL="0" lvl="0" indent="0" algn="ctr" defTabSz="755650" rtl="0">
+          <a:pPr lvl="0" algn="ctr" defTabSz="755650" rtl="0">
             <a:lnSpc>
               <a:spcPct val="90000"/>
             </a:lnSpc>
@@ -3521,7 +3706,6 @@
             <a:spcAft>
               <a:spcPct val="35000"/>
             </a:spcAft>
-            <a:buNone/>
           </a:pPr>
           <a:r>
             <a:rPr lang="en-US" sz="1700" kern="1200"/>
@@ -5016,7 +5200,7 @@
           <a:p>
             <a:fld id="{7D3FD8C9-866B-4352-9BA8-E78FEE8FB3FE}" type="datetimeFigureOut">
               <a:rPr lang="zh-CN" altLang="en-US" smtClean="0"/>
-              <a:t>2016/7/25</a:t>
+              <a:t>16/7/25</a:t>
             </a:fld>
             <a:endParaRPr lang="zh-CN" altLang="en-US"/>
           </a:p>
@@ -5367,6 +5551,178 @@
 </p:notes>
 </file>
 
+<file path=ppt/notesSlides/notesSlide10.xml><?xml version="1.0" encoding="utf-8"?>
+<p:notes xmlns:a="http://schemas.openxmlformats.org/drawingml/2006/main" xmlns:r="http://schemas.openxmlformats.org/officeDocument/2006/relationships" xmlns:p="http://schemas.openxmlformats.org/presentationml/2006/main">
+  <p:cSld>
+    <p:spTree>
+      <p:nvGrpSpPr>
+        <p:cNvPr id="1" name=""/>
+        <p:cNvGrpSpPr/>
+        <p:nvPr/>
+      </p:nvGrpSpPr>
+      <p:grpSpPr>
+        <a:xfrm>
+          <a:off x="0" y="0"/>
+          <a:ext cx="0" cy="0"/>
+          <a:chOff x="0" y="0"/>
+          <a:chExt cx="0" cy="0"/>
+        </a:xfrm>
+      </p:grpSpPr>
+      <p:sp>
+        <p:nvSpPr>
+          <p:cNvPr id="2" name="幻灯片图像占位符 1"/>
+          <p:cNvSpPr>
+            <a:spLocks noGrp="1" noRot="1" noChangeAspect="1"/>
+          </p:cNvSpPr>
+          <p:nvPr>
+            <p:ph type="sldImg"/>
+          </p:nvPr>
+        </p:nvSpPr>
+        <p:spPr/>
+      </p:sp>
+      <p:sp>
+        <p:nvSpPr>
+          <p:cNvPr id="3" name="备注占位符 2"/>
+          <p:cNvSpPr>
+            <a:spLocks noGrp="1"/>
+          </p:cNvSpPr>
+          <p:nvPr>
+            <p:ph type="body" idx="1"/>
+          </p:nvPr>
+        </p:nvSpPr>
+        <p:spPr/>
+        <p:txBody>
+          <a:bodyPr/>
+          <a:lstStyle/>
+          <a:p>
+            <a:endParaRPr lang="zh-CN" altLang="en-US" dirty="0"/>
+          </a:p>
+        </p:txBody>
+      </p:sp>
+      <p:sp>
+        <p:nvSpPr>
+          <p:cNvPr id="4" name="灯片编号占位符 3"/>
+          <p:cNvSpPr>
+            <a:spLocks noGrp="1"/>
+          </p:cNvSpPr>
+          <p:nvPr>
+            <p:ph type="sldNum" sz="quarter" idx="10"/>
+          </p:nvPr>
+        </p:nvSpPr>
+        <p:spPr/>
+        <p:txBody>
+          <a:bodyPr/>
+          <a:lstStyle/>
+          <a:p>
+            <a:fld id="{71C9854A-3A41-469C-95C5-60CB2D8C3AB9}" type="slidenum">
+              <a:rPr lang="zh-CN" altLang="en-US" smtClean="0"/>
+              <a:t>25</a:t>
+            </a:fld>
+            <a:endParaRPr lang="zh-CN" altLang="en-US"/>
+          </a:p>
+        </p:txBody>
+      </p:sp>
+    </p:spTree>
+    <p:extLst>
+      <p:ext uri="{BB962C8B-B14F-4D97-AF65-F5344CB8AC3E}">
+        <p14:creationId xmlns:p14="http://schemas.microsoft.com/office/powerpoint/2010/main" val="677870460"/>
+      </p:ext>
+    </p:extLst>
+  </p:cSld>
+  <p:clrMapOvr>
+    <a:masterClrMapping/>
+  </p:clrMapOvr>
+</p:notes>
+</file>
+
+<file path=ppt/notesSlides/notesSlide11.xml><?xml version="1.0" encoding="utf-8"?>
+<p:notes xmlns:a="http://schemas.openxmlformats.org/drawingml/2006/main" xmlns:r="http://schemas.openxmlformats.org/officeDocument/2006/relationships" xmlns:p="http://schemas.openxmlformats.org/presentationml/2006/main">
+  <p:cSld>
+    <p:spTree>
+      <p:nvGrpSpPr>
+        <p:cNvPr id="1" name=""/>
+        <p:cNvGrpSpPr/>
+        <p:nvPr/>
+      </p:nvGrpSpPr>
+      <p:grpSpPr>
+        <a:xfrm>
+          <a:off x="0" y="0"/>
+          <a:ext cx="0" cy="0"/>
+          <a:chOff x="0" y="0"/>
+          <a:chExt cx="0" cy="0"/>
+        </a:xfrm>
+      </p:grpSpPr>
+      <p:sp>
+        <p:nvSpPr>
+          <p:cNvPr id="2" name="幻灯片图像占位符 1"/>
+          <p:cNvSpPr>
+            <a:spLocks noGrp="1" noRot="1" noChangeAspect="1"/>
+          </p:cNvSpPr>
+          <p:nvPr>
+            <p:ph type="sldImg"/>
+          </p:nvPr>
+        </p:nvSpPr>
+        <p:spPr/>
+      </p:sp>
+      <p:sp>
+        <p:nvSpPr>
+          <p:cNvPr id="3" name="备注占位符 2"/>
+          <p:cNvSpPr>
+            <a:spLocks noGrp="1"/>
+          </p:cNvSpPr>
+          <p:nvPr>
+            <p:ph type="body" idx="1"/>
+          </p:nvPr>
+        </p:nvSpPr>
+        <p:spPr/>
+        <p:txBody>
+          <a:bodyPr/>
+          <a:lstStyle/>
+          <a:p>
+            <a:r>
+              <a:rPr kumimoji="1" lang="zh-CN" altLang="en-US" smtClean="0"/>
+              <a:t>填好</a:t>
+            </a:r>
+            <a:endParaRPr kumimoji="1" lang="zh-CN" altLang="en-US"/>
+          </a:p>
+        </p:txBody>
+      </p:sp>
+      <p:sp>
+        <p:nvSpPr>
+          <p:cNvPr id="4" name="幻灯片编号占位符 3"/>
+          <p:cNvSpPr>
+            <a:spLocks noGrp="1"/>
+          </p:cNvSpPr>
+          <p:nvPr>
+            <p:ph type="sldNum" sz="quarter" idx="10"/>
+          </p:nvPr>
+        </p:nvSpPr>
+        <p:spPr/>
+        <p:txBody>
+          <a:bodyPr/>
+          <a:lstStyle/>
+          <a:p>
+            <a:fld id="{71C9854A-3A41-469C-95C5-60CB2D8C3AB9}" type="slidenum">
+              <a:rPr lang="zh-CN" altLang="en-US" smtClean="0"/>
+              <a:t>30</a:t>
+            </a:fld>
+            <a:endParaRPr lang="zh-CN" altLang="en-US"/>
+          </a:p>
+        </p:txBody>
+      </p:sp>
+    </p:spTree>
+    <p:extLst>
+      <p:ext uri="{BB962C8B-B14F-4D97-AF65-F5344CB8AC3E}">
+        <p14:creationId xmlns:p14="http://schemas.microsoft.com/office/powerpoint/2010/main" val="813465002"/>
+      </p:ext>
+    </p:extLst>
+  </p:cSld>
+  <p:clrMapOvr>
+    <a:masterClrMapping/>
+  </p:clrMapOvr>
+</p:notes>
+</file>
+
 <file path=ppt/notesSlides/notesSlide2.xml><?xml version="1.0" encoding="utf-8"?>
 <p:notes xmlns:a="http://schemas.openxmlformats.org/drawingml/2006/main" xmlns:r="http://schemas.openxmlformats.org/officeDocument/2006/relationships" xmlns:p="http://schemas.openxmlformats.org/presentationml/2006/main">
   <p:cSld>
@@ -5949,13 +6305,17 @@
           <a:bodyPr/>
           <a:lstStyle/>
           <a:p>
-            <a:endParaRPr lang="zh-CN" altLang="en-US" dirty="0"/>
-          </a:p>
-        </p:txBody>
-      </p:sp>
-      <p:sp>
-        <p:nvSpPr>
-          <p:cNvPr id="4" name="灯片编号占位符 3"/>
+            <a:r>
+              <a:rPr kumimoji="1" lang="zh-CN" altLang="en-US" dirty="0" smtClean="0"/>
+              <a:t>改命令</a:t>
+            </a:r>
+            <a:endParaRPr kumimoji="1" lang="zh-CN" altLang="en-US" dirty="0"/>
+          </a:p>
+        </p:txBody>
+      </p:sp>
+      <p:sp>
+        <p:nvSpPr>
+          <p:cNvPr id="4" name="幻灯片编号占位符 3"/>
           <p:cNvSpPr>
             <a:spLocks noGrp="1"/>
           </p:cNvSpPr>
@@ -5970,7 +6330,7 @@
           <a:p>
             <a:fld id="{71C9854A-3A41-469C-95C5-60CB2D8C3AB9}" type="slidenum">
               <a:rPr lang="zh-CN" altLang="en-US" smtClean="0"/>
-              <a:t>24</a:t>
+              <a:t>23</a:t>
             </a:fld>
             <a:endParaRPr lang="zh-CN" altLang="en-US"/>
           </a:p>
@@ -5979,7 +6339,7 @@
     </p:spTree>
     <p:extLst>
       <p:ext uri="{BB962C8B-B14F-4D97-AF65-F5344CB8AC3E}">
-        <p14:creationId xmlns:p14="http://schemas.microsoft.com/office/powerpoint/2010/main" val="2931182636"/>
+        <p14:creationId xmlns:p14="http://schemas.microsoft.com/office/powerpoint/2010/main" val="1321756868"/>
       </p:ext>
     </p:extLst>
   </p:cSld>
@@ -6054,7 +6414,7 @@
           <a:p>
             <a:fld id="{71C9854A-3A41-469C-95C5-60CB2D8C3AB9}" type="slidenum">
               <a:rPr lang="zh-CN" altLang="en-US" smtClean="0"/>
-              <a:t>25</a:t>
+              <a:t>24</a:t>
             </a:fld>
             <a:endParaRPr lang="zh-CN" altLang="en-US"/>
           </a:p>
@@ -6063,7 +6423,7 @@
     </p:spTree>
     <p:extLst>
       <p:ext uri="{BB962C8B-B14F-4D97-AF65-F5344CB8AC3E}">
-        <p14:creationId xmlns:p14="http://schemas.microsoft.com/office/powerpoint/2010/main" val="677870460"/>
+        <p14:creationId xmlns:p14="http://schemas.microsoft.com/office/powerpoint/2010/main" val="2931182636"/>
       </p:ext>
     </p:extLst>
   </p:cSld>
@@ -6252,7 +6612,7 @@
           <a:p>
             <a:fld id="{A8B14F0C-7B7B-4AFA-B97B-D2221EA931C5}" type="datetime1">
               <a:rPr lang="zh-CN" altLang="en-US" smtClean="0"/>
-              <a:t>2016/7/25</a:t>
+              <a:t>16/7/25</a:t>
             </a:fld>
             <a:endParaRPr lang="zh-CN" altLang="en-US"/>
           </a:p>
@@ -6420,7 +6780,7 @@
           <a:p>
             <a:fld id="{10A97015-680D-4B9A-B052-282520BC09AF}" type="datetime1">
               <a:rPr lang="zh-CN" altLang="en-US" smtClean="0"/>
-              <a:t>2016/7/25</a:t>
+              <a:t>16/7/25</a:t>
             </a:fld>
             <a:endParaRPr lang="zh-CN" altLang="en-US"/>
           </a:p>
@@ -6598,7 +6958,7 @@
           <a:p>
             <a:fld id="{62826A2E-F8F6-4D5C-A457-6030273C9B60}" type="datetime1">
               <a:rPr lang="zh-CN" altLang="en-US" smtClean="0"/>
-              <a:t>2016/7/25</a:t>
+              <a:t>16/7/25</a:t>
             </a:fld>
             <a:endParaRPr lang="zh-CN" altLang="en-US"/>
           </a:p>
@@ -6775,7 +7135,7 @@
           <a:p>
             <a:fld id="{7F0BE63F-29BB-4A39-A02B-55BA68BE7152}" type="datetime1">
               <a:rPr lang="zh-CN" altLang="en-US" smtClean="0"/>
-              <a:t>2016/7/25</a:t>
+              <a:t>16/7/25</a:t>
             </a:fld>
             <a:endParaRPr lang="zh-CN" altLang="en-US"/>
           </a:p>
@@ -7020,7 +7380,7 @@
           <a:p>
             <a:fld id="{3A0EAE96-CBB8-4C6D-A431-2AC174D79D54}" type="datetime1">
               <a:rPr lang="zh-CN" altLang="en-US" smtClean="0"/>
-              <a:t>2016/7/25</a:t>
+              <a:t>16/7/25</a:t>
             </a:fld>
             <a:endParaRPr lang="zh-CN" altLang="en-US"/>
           </a:p>
@@ -7305,7 +7665,7 @@
           <a:p>
             <a:fld id="{BEDA5287-591F-40DF-8ABD-F89E9B28A5BE}" type="datetime1">
               <a:rPr lang="zh-CN" altLang="en-US" smtClean="0"/>
-              <a:t>2016/7/25</a:t>
+              <a:t>16/7/25</a:t>
             </a:fld>
             <a:endParaRPr lang="zh-CN" altLang="en-US"/>
           </a:p>
@@ -7724,7 +8084,7 @@
           <a:p>
             <a:fld id="{8CC14F33-5EBE-4B9A-B574-2CA58979CD63}" type="datetime1">
               <a:rPr lang="zh-CN" altLang="en-US" smtClean="0"/>
-              <a:t>2016/7/25</a:t>
+              <a:t>16/7/25</a:t>
             </a:fld>
             <a:endParaRPr lang="zh-CN" altLang="en-US"/>
           </a:p>
@@ -7841,7 +8201,7 @@
           <a:p>
             <a:fld id="{33871B04-7561-49E6-AF24-7BEFA3407D13}" type="datetime1">
               <a:rPr lang="zh-CN" altLang="en-US" smtClean="0"/>
-              <a:t>2016/7/25</a:t>
+              <a:t>16/7/25</a:t>
             </a:fld>
             <a:endParaRPr lang="zh-CN" altLang="en-US"/>
           </a:p>
@@ -7936,7 +8296,7 @@
           <a:p>
             <a:fld id="{F4B940BB-AF3B-42D0-9B82-9579D902CB8F}" type="datetime1">
               <a:rPr lang="zh-CN" altLang="en-US" smtClean="0"/>
-              <a:t>2016/7/25</a:t>
+              <a:t>16/7/25</a:t>
             </a:fld>
             <a:endParaRPr lang="zh-CN" altLang="en-US"/>
           </a:p>
@@ -8211,7 +8571,7 @@
           <a:p>
             <a:fld id="{A9C6D808-9695-44D0-8F24-EA678C854018}" type="datetime1">
               <a:rPr lang="zh-CN" altLang="en-US" smtClean="0"/>
-              <a:t>2016/7/25</a:t>
+              <a:t>16/7/25</a:t>
             </a:fld>
             <a:endParaRPr lang="zh-CN" altLang="en-US"/>
           </a:p>
@@ -8463,7 +8823,7 @@
           <a:p>
             <a:fld id="{0A651D11-65B3-4F14-8546-E5B73E0D61AB}" type="datetime1">
               <a:rPr lang="zh-CN" altLang="en-US" smtClean="0"/>
-              <a:t>2016/7/25</a:t>
+              <a:t>16/7/25</a:t>
             </a:fld>
             <a:endParaRPr lang="zh-CN" altLang="en-US"/>
           </a:p>
@@ -8674,7 +9034,7 @@
           <a:p>
             <a:fld id="{4D5043EF-B242-4B54-A793-909CE59C0D05}" type="datetime1">
               <a:rPr lang="zh-CN" altLang="en-US" smtClean="0"/>
-              <a:t>2016/7/25</a:t>
+              <a:t>16/7/25</a:t>
             </a:fld>
             <a:endParaRPr lang="zh-CN" altLang="en-US"/>
           </a:p>
@@ -9134,7 +9494,7 @@
           <a:p>
             <a:fld id="{5C75B572-EF5A-4B22-8AE6-17C8C2DFEEA9}" type="datetime1">
               <a:rPr lang="zh-CN" altLang="en-US" smtClean="0"/>
-              <a:t>2016/7/25</a:t>
+              <a:t>16/7/25</a:t>
             </a:fld>
             <a:endParaRPr lang="zh-CN" altLang="en-US" dirty="0"/>
           </a:p>
@@ -9445,7 +9805,7 @@
           <a:p>
             <a:fld id="{520DBEF7-B94C-4F76-AFAD-17048593A86C}" type="datetime1">
               <a:rPr lang="zh-CN" altLang="en-US" smtClean="0"/>
-              <a:t>2016/7/25</a:t>
+              <a:t>16/7/25</a:t>
             </a:fld>
             <a:endParaRPr lang="zh-CN" altLang="en-US"/>
           </a:p>
@@ -9585,7 +9945,7 @@
           <a:p>
             <a:fld id="{59663E60-4836-4BC2-BCCA-9100AC856ACF}" type="datetime1">
               <a:rPr lang="zh-CN" altLang="en-US" smtClean="0"/>
-              <a:t>2016/7/25</a:t>
+              <a:t>16/7/25</a:t>
             </a:fld>
             <a:endParaRPr lang="zh-CN" altLang="en-US"/>
           </a:p>
@@ -9896,7 +10256,7 @@
           <a:p>
             <a:fld id="{E918460D-6D3F-4134-A840-F95176E6E708}" type="datetime1">
               <a:rPr lang="zh-CN" altLang="en-US" smtClean="0"/>
-              <a:t>2016/7/25</a:t>
+              <a:t>16/7/25</a:t>
             </a:fld>
             <a:endParaRPr lang="zh-CN" altLang="en-US"/>
           </a:p>
@@ -9912,6 +10272,14 @@
   <p:clrMapOvr>
     <a:masterClrMapping/>
   </p:clrMapOvr>
+  <mc:AlternateContent xmlns:mc="http://schemas.openxmlformats.org/markup-compatibility/2006">
+    <mc:Choice xmlns:p14="http://schemas.microsoft.com/office/powerpoint/2010/main" Requires="p14">
+      <p:transition spd="slow" p14:dur="2000"/>
+    </mc:Choice>
+    <mc:Fallback>
+      <p:transition spd="slow"/>
+    </mc:Fallback>
+  </mc:AlternateContent>
 </p:sld>
 </file>
 
@@ -10019,7 +10387,7 @@
           <a:p>
             <a:fld id="{E918460D-6D3F-4134-A840-F95176E6E708}" type="datetime1">
               <a:rPr lang="zh-CN" altLang="en-US" smtClean="0"/>
-              <a:t>2016/7/25</a:t>
+              <a:t>16/7/25</a:t>
             </a:fld>
             <a:endParaRPr lang="zh-CN" altLang="en-US"/>
           </a:p>
@@ -10245,6 +10613,14 @@
   <p:clrMapOvr>
     <a:masterClrMapping/>
   </p:clrMapOvr>
+  <mc:AlternateContent xmlns:mc="http://schemas.openxmlformats.org/markup-compatibility/2006">
+    <mc:Choice xmlns:p14="http://schemas.microsoft.com/office/powerpoint/2010/main" Requires="p14">
+      <p:transition spd="slow" p14:dur="2000"/>
+    </mc:Choice>
+    <mc:Fallback>
+      <p:transition spd="slow"/>
+    </mc:Fallback>
+  </mc:AlternateContent>
 </p:sld>
 </file>
 
@@ -10305,7 +10681,7 @@
           <a:p>
             <a:fld id="{9A5743E6-3416-40DE-9A69-87F4D4229038}" type="datetime1">
               <a:rPr lang="zh-CN" altLang="en-US" smtClean="0"/>
-              <a:t>2016/7/25</a:t>
+              <a:t>16/7/25</a:t>
             </a:fld>
             <a:endParaRPr lang="zh-CN" altLang="en-US"/>
           </a:p>
@@ -10498,7 +10874,7 @@
           <a:p>
             <a:fld id="{9A5743E6-3416-40DE-9A69-87F4D4229038}" type="datetime1">
               <a:rPr lang="zh-CN" altLang="en-US" smtClean="0"/>
-              <a:t>2016/7/25</a:t>
+              <a:t>16/7/25</a:t>
             </a:fld>
             <a:endParaRPr lang="zh-CN" altLang="en-US"/>
           </a:p>
@@ -11124,6 +11500,14 @@
   <p:clrMapOvr>
     <a:masterClrMapping/>
   </p:clrMapOvr>
+  <mc:AlternateContent xmlns:mc="http://schemas.openxmlformats.org/markup-compatibility/2006">
+    <mc:Choice xmlns:p14="http://schemas.microsoft.com/office/powerpoint/2010/main" Requires="p14">
+      <p:transition spd="slow" p14:dur="2000"/>
+    </mc:Choice>
+    <mc:Fallback>
+      <p:transition spd="slow"/>
+    </mc:Fallback>
+  </mc:AlternateContent>
 </p:sld>
 </file>
 
@@ -11291,7 +11675,7 @@
           <a:p>
             <a:fld id="{E24B9186-B14B-412F-A517-5EAB9A7E23B3}" type="datetime1">
               <a:rPr lang="zh-CN" altLang="en-US" smtClean="0"/>
-              <a:t>2016/7/25</a:t>
+              <a:t>16/7/25</a:t>
             </a:fld>
             <a:endParaRPr lang="zh-CN" altLang="en-US"/>
           </a:p>
@@ -11572,7 +11956,7 @@
           <a:p>
             <a:fld id="{838B88C3-EF52-4FAD-BCAF-FE7662002012}" type="datetime1">
               <a:rPr lang="zh-CN" altLang="en-US" smtClean="0"/>
-              <a:t>2016/7/25</a:t>
+              <a:t>16/7/25</a:t>
             </a:fld>
             <a:endParaRPr lang="zh-CN" altLang="en-US"/>
           </a:p>
@@ -11996,7 +12380,7 @@
           <a:p>
             <a:fld id="{838B88C3-EF52-4FAD-BCAF-FE7662002012}" type="datetime1">
               <a:rPr lang="zh-CN" altLang="en-US" smtClean="0"/>
-              <a:t>2016/7/25</a:t>
+              <a:t>16/7/25</a:t>
             </a:fld>
             <a:endParaRPr lang="zh-CN" altLang="en-US"/>
           </a:p>
@@ -12141,7 +12525,7 @@
           <a:p>
             <a:fld id="{F3A6A64E-5DC9-4093-BE19-477C24ABD859}" type="datetime1">
               <a:rPr lang="zh-CN" altLang="en-US" smtClean="0"/>
-              <a:t>2016/7/25</a:t>
+              <a:t>16/7/25</a:t>
             </a:fld>
             <a:endParaRPr lang="zh-CN" altLang="en-US"/>
           </a:p>
@@ -12305,7 +12689,7 @@
           <a:p>
             <a:fld id="{5E9EDCF8-D286-4E1D-9375-84D78D0AD50E}" type="datetime1">
               <a:rPr lang="zh-CN" altLang="en-US" smtClean="0"/>
-              <a:t>2016/7/25</a:t>
+              <a:t>16/7/25</a:t>
             </a:fld>
             <a:endParaRPr lang="zh-CN" altLang="en-US"/>
           </a:p>
@@ -12643,7 +13027,7 @@
           <a:p>
             <a:fld id="{D69B4C5C-ED01-4E3B-A26B-4D49EB11DA60}" type="datetime1">
               <a:rPr lang="zh-CN" altLang="en-US" smtClean="0"/>
-              <a:t>2016/7/25</a:t>
+              <a:t>16/7/25</a:t>
             </a:fld>
             <a:endParaRPr lang="zh-CN" altLang="en-US"/>
           </a:p>
@@ -12826,7 +13210,7 @@
           <a:p>
             <a:fld id="{E24B9186-B14B-412F-A517-5EAB9A7E23B3}" type="datetime1">
               <a:rPr lang="zh-CN" altLang="en-US" smtClean="0"/>
-              <a:t>2016/7/25</a:t>
+              <a:t>16/7/25</a:t>
             </a:fld>
             <a:endParaRPr lang="zh-CN" altLang="en-US"/>
           </a:p>
@@ -12947,7 +13331,7 @@
           <a:p>
             <a:fld id="{D69B4C5C-ED01-4E3B-A26B-4D49EB11DA60}" type="datetime1">
               <a:rPr lang="zh-CN" altLang="en-US" smtClean="0"/>
-              <a:t>2016/7/25</a:t>
+              <a:t>16/7/25</a:t>
             </a:fld>
             <a:endParaRPr lang="zh-CN" altLang="en-US"/>
           </a:p>
@@ -12979,21 +13363,21 @@
                 <a:gridCol w="2170585">
                   <a:extLst>
                     <a:ext uri="{9D8B030D-6E8A-4147-A177-3AD203B41FA5}">
-                      <a16:colId xmlns:a16="http://schemas.microsoft.com/office/drawing/2014/main" val="20000"/>
+                      <a16:colId xmlns:a16="http://schemas.microsoft.com/office/drawing/2014/main" xmlns="" val="20000"/>
                     </a:ext>
                   </a:extLst>
                 </a:gridCol>
                 <a:gridCol w="3315815">
                   <a:extLst>
                     <a:ext uri="{9D8B030D-6E8A-4147-A177-3AD203B41FA5}">
-                      <a16:colId xmlns:a16="http://schemas.microsoft.com/office/drawing/2014/main" val="20001"/>
+                      <a16:colId xmlns:a16="http://schemas.microsoft.com/office/drawing/2014/main" xmlns="" val="20001"/>
                     </a:ext>
                   </a:extLst>
                 </a:gridCol>
                 <a:gridCol w="2743200">
                   <a:extLst>
                     <a:ext uri="{9D8B030D-6E8A-4147-A177-3AD203B41FA5}">
-                      <a16:colId xmlns:a16="http://schemas.microsoft.com/office/drawing/2014/main" val="20002"/>
+                      <a16:colId xmlns:a16="http://schemas.microsoft.com/office/drawing/2014/main" xmlns="" val="20002"/>
                     </a:ext>
                   </a:extLst>
                 </a:gridCol>
@@ -13244,7 +13628,7 @@
                 </a:tc>
                 <a:extLst>
                   <a:ext uri="{0D108BD9-81ED-4DB2-BD59-A6C34878D82A}">
-                    <a16:rowId xmlns:a16="http://schemas.microsoft.com/office/drawing/2014/main" val="10000"/>
+                    <a16:rowId xmlns:a16="http://schemas.microsoft.com/office/drawing/2014/main" xmlns="" val="10000"/>
                   </a:ext>
                 </a:extLst>
               </a:tr>
@@ -13628,7 +14012,7 @@
                 </a:tc>
                 <a:extLst>
                   <a:ext uri="{0D108BD9-81ED-4DB2-BD59-A6C34878D82A}">
-                    <a16:rowId xmlns:a16="http://schemas.microsoft.com/office/drawing/2014/main" val="10002"/>
+                    <a16:rowId xmlns:a16="http://schemas.microsoft.com/office/drawing/2014/main" xmlns="" val="10002"/>
                   </a:ext>
                 </a:extLst>
               </a:tr>
@@ -14045,7 +14429,7 @@
                 </a:tc>
                 <a:extLst>
                   <a:ext uri="{0D108BD9-81ED-4DB2-BD59-A6C34878D82A}">
-                    <a16:rowId xmlns:a16="http://schemas.microsoft.com/office/drawing/2014/main" val="10003"/>
+                    <a16:rowId xmlns:a16="http://schemas.microsoft.com/office/drawing/2014/main" xmlns="" val="10003"/>
                   </a:ext>
                 </a:extLst>
               </a:tr>
@@ -14495,7 +14879,7 @@
                 </a:tc>
                 <a:extLst>
                   <a:ext uri="{0D108BD9-81ED-4DB2-BD59-A6C34878D82A}">
-                    <a16:rowId xmlns:a16="http://schemas.microsoft.com/office/drawing/2014/main" val="10004"/>
+                    <a16:rowId xmlns:a16="http://schemas.microsoft.com/office/drawing/2014/main" xmlns="" val="10004"/>
                   </a:ext>
                 </a:extLst>
               </a:tr>
@@ -16201,7 +16585,7 @@
           <a:p>
             <a:fld id="{BD9BEC3B-8491-4FBA-94D5-C692EE49C8C8}" type="datetime1">
               <a:rPr lang="zh-CN" altLang="en-US" smtClean="0"/>
-              <a:t>2016/7/25</a:t>
+              <a:t>16/7/25</a:t>
             </a:fld>
             <a:endParaRPr lang="zh-CN" altLang="en-US"/>
           </a:p>
@@ -17737,7 +18121,7 @@
           <a:p>
             <a:fld id="{BD9BEC3B-8491-4FBA-94D5-C692EE49C8C8}" type="datetime1">
               <a:rPr lang="zh-CN" altLang="en-US" smtClean="0"/>
-              <a:t>2016/7/25</a:t>
+              <a:t>16/7/25</a:t>
             </a:fld>
             <a:endParaRPr lang="zh-CN" altLang="en-US"/>
           </a:p>
@@ -17920,7 +18304,7 @@
           <a:p>
             <a:fld id="{E24B9186-B14B-412F-A517-5EAB9A7E23B3}" type="datetime1">
               <a:rPr lang="zh-CN" altLang="en-US" smtClean="0"/>
-              <a:t>2016/7/25</a:t>
+              <a:t>16/7/25</a:t>
             </a:fld>
             <a:endParaRPr lang="zh-CN" altLang="en-US"/>
           </a:p>
@@ -18015,7 +18399,7 @@
           <a:p>
             <a:fld id="{C1D4F7DD-263F-4C5F-A4F9-B010F65DFD17}" type="datetime1">
               <a:rPr lang="zh-CN" altLang="en-US" smtClean="0"/>
-              <a:t>2016/7/25</a:t>
+              <a:t>16/7/25</a:t>
             </a:fld>
             <a:endParaRPr lang="zh-CN" altLang="en-US"/>
           </a:p>
@@ -18192,7 +18576,7 @@
           <a:p>
             <a:fld id="{E24B9186-B14B-412F-A517-5EAB9A7E23B3}" type="datetime1">
               <a:rPr lang="zh-CN" altLang="en-US" smtClean="0"/>
-              <a:t>2016/7/25</a:t>
+              <a:t>16/7/25</a:t>
             </a:fld>
             <a:endParaRPr lang="zh-CN" altLang="en-US"/>
           </a:p>
@@ -18331,7 +18715,7 @@
           <a:p>
             <a:fld id="{FC91C104-76BD-4C9C-8475-1BCC6B31C9F1}" type="datetime1">
               <a:rPr lang="zh-CN" altLang="en-US" smtClean="0"/>
-              <a:t>2016/7/25</a:t>
+              <a:t>16/7/25</a:t>
             </a:fld>
             <a:endParaRPr lang="zh-CN" altLang="en-US"/>
           </a:p>
@@ -18505,7 +18889,7 @@
           <a:p>
             <a:fld id="{98E086D8-1854-4026-8A21-4877218E6D0B}" type="datetime1">
               <a:rPr lang="zh-CN" altLang="en-US" smtClean="0"/>
-              <a:t>2016/7/25</a:t>
+              <a:t>16/7/25</a:t>
             </a:fld>
             <a:endParaRPr lang="zh-CN" altLang="en-US"/>
           </a:p>
@@ -18593,14 +18977,14 @@
                 <a:gridCol w="4114800">
                   <a:extLst>
                     <a:ext uri="{9D8B030D-6E8A-4147-A177-3AD203B41FA5}">
-                      <a16:colId xmlns:a16="http://schemas.microsoft.com/office/drawing/2014/main" val="816746908"/>
+                      <a16:colId xmlns:a16="http://schemas.microsoft.com/office/drawing/2014/main" xmlns="" val="816746908"/>
                     </a:ext>
                   </a:extLst>
                 </a:gridCol>
                 <a:gridCol w="4114800">
                   <a:extLst>
                     <a:ext uri="{9D8B030D-6E8A-4147-A177-3AD203B41FA5}">
-                      <a16:colId xmlns:a16="http://schemas.microsoft.com/office/drawing/2014/main" val="2464665697"/>
+                      <a16:colId xmlns:a16="http://schemas.microsoft.com/office/drawing/2014/main" xmlns="" val="2464665697"/>
                     </a:ext>
                   </a:extLst>
                 </a:gridCol>
@@ -18642,7 +19026,7 @@
                 </a:tc>
                 <a:extLst>
                   <a:ext uri="{0D108BD9-81ED-4DB2-BD59-A6C34878D82A}">
-                    <a16:rowId xmlns:a16="http://schemas.microsoft.com/office/drawing/2014/main" val="2405905591"/>
+                    <a16:rowId xmlns:a16="http://schemas.microsoft.com/office/drawing/2014/main" xmlns="" val="2405905591"/>
                   </a:ext>
                 </a:extLst>
               </a:tr>
@@ -18669,7 +19053,7 @@
                 </a:tc>
                 <a:extLst>
                   <a:ext uri="{0D108BD9-81ED-4DB2-BD59-A6C34878D82A}">
-                    <a16:rowId xmlns:a16="http://schemas.microsoft.com/office/drawing/2014/main" val="3576140149"/>
+                    <a16:rowId xmlns:a16="http://schemas.microsoft.com/office/drawing/2014/main" xmlns="" val="3576140149"/>
                   </a:ext>
                 </a:extLst>
               </a:tr>
@@ -18696,7 +19080,7 @@
                 </a:tc>
                 <a:extLst>
                   <a:ext uri="{0D108BD9-81ED-4DB2-BD59-A6C34878D82A}">
-                    <a16:rowId xmlns:a16="http://schemas.microsoft.com/office/drawing/2014/main" val="31572913"/>
+                    <a16:rowId xmlns:a16="http://schemas.microsoft.com/office/drawing/2014/main" xmlns="" val="31572913"/>
                   </a:ext>
                 </a:extLst>
               </a:tr>
@@ -18723,7 +19107,7 @@
                 </a:tc>
                 <a:extLst>
                   <a:ext uri="{0D108BD9-81ED-4DB2-BD59-A6C34878D82A}">
-                    <a16:rowId xmlns:a16="http://schemas.microsoft.com/office/drawing/2014/main" val="1418746993"/>
+                    <a16:rowId xmlns:a16="http://schemas.microsoft.com/office/drawing/2014/main" xmlns="" val="1418746993"/>
                   </a:ext>
                 </a:extLst>
               </a:tr>
@@ -18748,7 +19132,7 @@
           <a:p>
             <a:fld id="{7F0BE63F-29BB-4A39-A02B-55BA68BE7152}" type="datetime1">
               <a:rPr lang="zh-CN" altLang="en-US" smtClean="0"/>
-              <a:t>2016/7/25</a:t>
+              <a:t>16/7/25</a:t>
             </a:fld>
             <a:endParaRPr lang="zh-CN" altLang="en-US"/>
           </a:p>
@@ -19048,7 +19432,7 @@
           <a:p>
             <a:fld id="{0A86E95A-A9B7-4927-BA56-D1E6EC17C801}" type="datetime1">
               <a:rPr lang="zh-CN" altLang="en-US" smtClean="0"/>
-              <a:t>2016/7/25</a:t>
+              <a:t>16/7/25</a:t>
             </a:fld>
             <a:endParaRPr lang="zh-CN" altLang="en-US"/>
           </a:p>
@@ -19144,7 +19528,7 @@
           <a:p>
             <a:fld id="{4D5DA046-07BA-48AE-9FC8-C3C53067BA69}" type="datetime1">
               <a:rPr lang="zh-CN" altLang="en-US" smtClean="0"/>
-              <a:t>2016/7/25</a:t>
+              <a:t>16/7/25</a:t>
             </a:fld>
             <a:endParaRPr lang="zh-CN" altLang="en-US"/>
           </a:p>
@@ -19860,7 +20244,7 @@
           <a:p>
             <a:fld id="{9F20E11B-2E48-4656-BC97-71689B76E9CD}" type="datetime1">
               <a:rPr lang="zh-CN" altLang="en-US" smtClean="0"/>
-              <a:t>2016/7/25</a:t>
+              <a:t>16/7/25</a:t>
             </a:fld>
             <a:endParaRPr lang="zh-CN" altLang="en-US"/>
           </a:p>
@@ -20712,7 +21096,7 @@
           <a:p>
             <a:fld id="{C9149B9F-A834-453A-8E18-9495B8240410}" type="datetime1">
               <a:rPr lang="zh-CN" altLang="en-US" smtClean="0"/>
-              <a:t>2016/7/25</a:t>
+              <a:t>16/7/25</a:t>
             </a:fld>
             <a:endParaRPr lang="zh-CN" altLang="en-US"/>
           </a:p>
@@ -20886,7 +21270,7 @@
           <a:p>
             <a:fld id="{3E3AC555-B870-477B-A235-13D29F7C9F57}" type="datetime1">
               <a:rPr lang="zh-CN" altLang="en-US" smtClean="0"/>
-              <a:t>2016/7/25</a:t>
+              <a:t>16/7/25</a:t>
             </a:fld>
             <a:endParaRPr lang="zh-CN" altLang="en-US"/>
           </a:p>
@@ -21071,7 +21455,7 @@
           <a:p>
             <a:fld id="{8AD2FE68-E24D-4006-8ECD-091F5777935A}" type="datetime1">
               <a:rPr lang="zh-CN" altLang="en-US" smtClean="0"/>
-              <a:t>2016/7/25</a:t>
+              <a:t>16/7/25</a:t>
             </a:fld>
             <a:endParaRPr lang="zh-CN" altLang="en-US"/>
           </a:p>
@@ -21152,7 +21536,7 @@
           <a:p>
             <a:fld id="{2CDFFD0A-502C-4CB6-B714-EFCFA84D6BFF}" type="datetime1">
               <a:rPr lang="zh-CN" altLang="en-US" smtClean="0"/>
-              <a:t>2016/7/25</a:t>
+              <a:t>16/7/25</a:t>
             </a:fld>
             <a:endParaRPr lang="zh-CN" altLang="en-US"/>
           </a:p>
@@ -22630,7 +23014,7 @@
           <a:p>
             <a:fld id="{E918460D-6D3F-4134-A840-F95176E6E708}" type="datetime1">
               <a:rPr lang="zh-CN" altLang="en-US" smtClean="0"/>
-              <a:t>2016/7/25</a:t>
+              <a:t>16/7/25</a:t>
             </a:fld>
             <a:endParaRPr lang="zh-CN" altLang="en-US"/>
           </a:p>

</xml_diff>